<commit_message>
En este commit lo que se realiza es la entrega A2501/EV02
</commit_message>
<xml_diff>
--- a/Fase 1/Actividad Proyecto 1/A2501/EV02/VIDEO DE PRESENTATION.pptx
+++ b/Fase 1/Actividad Proyecto 1/A2501/EV02/VIDEO DE PRESENTATION.pptx
@@ -305,7 +305,7 @@
           <a:p>
             <a:fld id="{3E6ACBE1-78E3-4D68-927B-CCEA0490E4DD}" type="datetimeFigureOut">
               <a:rPr lang="es-MX" smtClean="0"/>
-              <a:t>12/07/2022</a:t>
+              <a:t>27/08/2022</a:t>
             </a:fld>
             <a:endParaRPr lang="es-MX"/>
           </a:p>
@@ -643,7 +643,7 @@
           <a:p>
             <a:fld id="{3E6ACBE1-78E3-4D68-927B-CCEA0490E4DD}" type="datetimeFigureOut">
               <a:rPr lang="es-MX" smtClean="0"/>
-              <a:t>12/07/2022</a:t>
+              <a:t>27/08/2022</a:t>
             </a:fld>
             <a:endParaRPr lang="es-MX"/>
           </a:p>
@@ -1044,7 +1044,7 @@
           <a:p>
             <a:fld id="{3E6ACBE1-78E3-4D68-927B-CCEA0490E4DD}" type="datetimeFigureOut">
               <a:rPr lang="es-MX" smtClean="0"/>
-              <a:t>12/07/2022</a:t>
+              <a:t>27/08/2022</a:t>
             </a:fld>
             <a:endParaRPr lang="es-MX"/>
           </a:p>
@@ -1380,7 +1380,7 @@
           <a:p>
             <a:fld id="{3E6ACBE1-78E3-4D68-927B-CCEA0490E4DD}" type="datetimeFigureOut">
               <a:rPr lang="es-MX" smtClean="0"/>
-              <a:t>12/07/2022</a:t>
+              <a:t>27/08/2022</a:t>
             </a:fld>
             <a:endParaRPr lang="es-MX"/>
           </a:p>
@@ -1700,7 +1700,7 @@
           <a:p>
             <a:fld id="{3E6ACBE1-78E3-4D68-927B-CCEA0490E4DD}" type="datetimeFigureOut">
               <a:rPr lang="es-MX" smtClean="0"/>
-              <a:t>12/07/2022</a:t>
+              <a:t>27/08/2022</a:t>
             </a:fld>
             <a:endParaRPr lang="es-MX"/>
           </a:p>
@@ -2096,7 +2096,7 @@
           <a:p>
             <a:fld id="{3E6ACBE1-78E3-4D68-927B-CCEA0490E4DD}" type="datetimeFigureOut">
               <a:rPr lang="es-MX" smtClean="0"/>
-              <a:t>12/07/2022</a:t>
+              <a:t>27/08/2022</a:t>
             </a:fld>
             <a:endParaRPr lang="es-MX"/>
           </a:p>
@@ -2353,7 +2353,7 @@
           <a:p>
             <a:fld id="{3E6ACBE1-78E3-4D68-927B-CCEA0490E4DD}" type="datetimeFigureOut">
               <a:rPr lang="es-MX" smtClean="0"/>
-              <a:t>12/07/2022</a:t>
+              <a:t>27/08/2022</a:t>
             </a:fld>
             <a:endParaRPr lang="es-MX"/>
           </a:p>
@@ -2615,7 +2615,7 @@
           <a:p>
             <a:fld id="{3E6ACBE1-78E3-4D68-927B-CCEA0490E4DD}" type="datetimeFigureOut">
               <a:rPr lang="es-MX" smtClean="0"/>
-              <a:t>12/07/2022</a:t>
+              <a:t>27/08/2022</a:t>
             </a:fld>
             <a:endParaRPr lang="es-MX"/>
           </a:p>
@@ -2877,7 +2877,7 @@
           <a:p>
             <a:fld id="{3E6ACBE1-78E3-4D68-927B-CCEA0490E4DD}" type="datetimeFigureOut">
               <a:rPr lang="es-MX" smtClean="0"/>
-              <a:t>12/07/2022</a:t>
+              <a:t>27/08/2022</a:t>
             </a:fld>
             <a:endParaRPr lang="es-MX"/>
           </a:p>
@@ -3206,7 +3206,7 @@
           <a:p>
             <a:fld id="{3E6ACBE1-78E3-4D68-927B-CCEA0490E4DD}" type="datetimeFigureOut">
               <a:rPr lang="es-MX" smtClean="0"/>
-              <a:t>12/07/2022</a:t>
+              <a:t>27/08/2022</a:t>
             </a:fld>
             <a:endParaRPr lang="es-MX"/>
           </a:p>
@@ -3529,7 +3529,7 @@
           <a:p>
             <a:fld id="{3E6ACBE1-78E3-4D68-927B-CCEA0490E4DD}" type="datetimeFigureOut">
               <a:rPr lang="es-MX" smtClean="0"/>
-              <a:t>12/07/2022</a:t>
+              <a:t>27/08/2022</a:t>
             </a:fld>
             <a:endParaRPr lang="es-MX"/>
           </a:p>
@@ -3986,7 +3986,7 @@
           <a:p>
             <a:fld id="{3E6ACBE1-78E3-4D68-927B-CCEA0490E4DD}" type="datetimeFigureOut">
               <a:rPr lang="es-MX" smtClean="0"/>
-              <a:t>12/07/2022</a:t>
+              <a:t>27/08/2022</a:t>
             </a:fld>
             <a:endParaRPr lang="es-MX"/>
           </a:p>
@@ -4191,7 +4191,7 @@
           <a:p>
             <a:fld id="{3E6ACBE1-78E3-4D68-927B-CCEA0490E4DD}" type="datetimeFigureOut">
               <a:rPr lang="es-MX" smtClean="0"/>
-              <a:t>12/07/2022</a:t>
+              <a:t>27/08/2022</a:t>
             </a:fld>
             <a:endParaRPr lang="es-MX"/>
           </a:p>
@@ -4368,7 +4368,7 @@
           <a:p>
             <a:fld id="{3E6ACBE1-78E3-4D68-927B-CCEA0490E4DD}" type="datetimeFigureOut">
               <a:rPr lang="es-MX" smtClean="0"/>
-              <a:t>12/07/2022</a:t>
+              <a:t>27/08/2022</a:t>
             </a:fld>
             <a:endParaRPr lang="es-MX"/>
           </a:p>
@@ -4701,7 +4701,7 @@
           <a:p>
             <a:fld id="{3E6ACBE1-78E3-4D68-927B-CCEA0490E4DD}" type="datetimeFigureOut">
               <a:rPr lang="es-MX" smtClean="0"/>
-              <a:t>12/07/2022</a:t>
+              <a:t>27/08/2022</a:t>
             </a:fld>
             <a:endParaRPr lang="es-MX"/>
           </a:p>
@@ -5046,7 +5046,7 @@
           <a:p>
             <a:fld id="{3E6ACBE1-78E3-4D68-927B-CCEA0490E4DD}" type="datetimeFigureOut">
               <a:rPr lang="es-MX" smtClean="0"/>
-              <a:t>12/07/2022</a:t>
+              <a:t>27/08/2022</a:t>
             </a:fld>
             <a:endParaRPr lang="es-MX"/>
           </a:p>
@@ -7163,7 +7163,7 @@
           <a:p>
             <a:fld id="{3E6ACBE1-78E3-4D68-927B-CCEA0490E4DD}" type="datetimeFigureOut">
               <a:rPr lang="es-MX" smtClean="0"/>
-              <a:t>12/07/2022</a:t>
+              <a:t>27/08/2022</a:t>
             </a:fld>
             <a:endParaRPr lang="es-MX"/>
           </a:p>
@@ -7947,7 +7947,7 @@
         </p:spPr>
         <p:txBody>
           <a:bodyPr>
-            <a:normAutofit fontScale="92500" lnSpcReduction="20000"/>
+            <a:normAutofit/>
           </a:bodyPr>
           <a:lstStyle/>
           <a:p>
@@ -8061,45 +8061,12 @@
               <a:t>NAME OF THE ACTIVITY: </a:t>
             </a:r>
             <a:r>
-              <a:rPr lang="es-CO" sz="3200" dirty="0">
+              <a:rPr lang="es-CO" sz="3200">
                 <a:solidFill>
                   <a:srgbClr val="FF0000"/>
                 </a:solidFill>
               </a:rPr>
-              <a:t>Video </a:t>
-            </a:r>
-            <a:r>
-              <a:rPr lang="es-CO" sz="3200" dirty="0" err="1">
-                <a:solidFill>
-                  <a:srgbClr val="FF0000"/>
-                </a:solidFill>
-              </a:rPr>
-              <a:t>Presentació</a:t>
-            </a:r>
-            <a:endParaRPr lang="es-CO" sz="3200" dirty="0">
-              <a:solidFill>
-                <a:srgbClr val="FF0000"/>
-              </a:solidFill>
-            </a:endParaRPr>
-          </a:p>
-          <a:p>
-            <a:r>
-              <a:rPr lang="es-CO" sz="3200" dirty="0">
-                <a:solidFill>
-                  <a:srgbClr val="FF0000"/>
-                </a:solidFill>
-              </a:rPr>
-              <a:t>Esto es para quitar </a:t>
-            </a:r>
-          </a:p>
-          <a:p>
-            <a:r>
-              <a:rPr lang="es-CO" sz="3200">
-                <a:solidFill>
-                  <a:srgbClr val="FF0000"/>
-                </a:solidFill>
-              </a:rPr>
-              <a:t>https://www.youtube.com/watch?v=Uvwe9jRqciU&amp;ab_channel=EVALUCYARRIETABARRIOS</a:t>
+              <a:t>Video Presentación</a:t>
             </a:r>
             <a:endParaRPr lang="es-CO" sz="3200" dirty="0">
               <a:solidFill>

</xml_diff>